<commit_message>
Swapped picture to a more recent version of the GUI
</commit_message>
<xml_diff>
--- a/saturn/personal-payment-terminal.pptx
+++ b/saturn/personal-payment-terminal.pptx
@@ -288,7 +288,7 @@
           <a:p>
             <a:fld id="{FC080E38-6FF2-48B3-BDAB-4FA23B840E92}" type="datetimeFigureOut">
               <a:rPr lang="en-US" smtClean="0"/>
-              <a:t>2020-09-21</a:t>
+              <a:t>2020-12-22</a:t>
             </a:fld>
             <a:endParaRPr lang="en-US"/>
           </a:p>
@@ -458,7 +458,7 @@
           <a:p>
             <a:fld id="{FC080E38-6FF2-48B3-BDAB-4FA23B840E92}" type="datetimeFigureOut">
               <a:rPr lang="en-US" smtClean="0"/>
-              <a:t>2020-09-21</a:t>
+              <a:t>2020-12-22</a:t>
             </a:fld>
             <a:endParaRPr lang="en-US"/>
           </a:p>
@@ -638,7 +638,7 @@
           <a:p>
             <a:fld id="{FC080E38-6FF2-48B3-BDAB-4FA23B840E92}" type="datetimeFigureOut">
               <a:rPr lang="en-US" smtClean="0"/>
-              <a:t>2020-09-21</a:t>
+              <a:t>2020-12-22</a:t>
             </a:fld>
             <a:endParaRPr lang="en-US"/>
           </a:p>
@@ -808,7 +808,7 @@
           <a:p>
             <a:fld id="{FC080E38-6FF2-48B3-BDAB-4FA23B840E92}" type="datetimeFigureOut">
               <a:rPr lang="en-US" smtClean="0"/>
-              <a:t>2020-09-21</a:t>
+              <a:t>2020-12-22</a:t>
             </a:fld>
             <a:endParaRPr lang="en-US"/>
           </a:p>
@@ -1054,7 +1054,7 @@
           <a:p>
             <a:fld id="{FC080E38-6FF2-48B3-BDAB-4FA23B840E92}" type="datetimeFigureOut">
               <a:rPr lang="en-US" smtClean="0"/>
-              <a:t>2020-09-21</a:t>
+              <a:t>2020-12-22</a:t>
             </a:fld>
             <a:endParaRPr lang="en-US"/>
           </a:p>
@@ -1342,7 +1342,7 @@
           <a:p>
             <a:fld id="{FC080E38-6FF2-48B3-BDAB-4FA23B840E92}" type="datetimeFigureOut">
               <a:rPr lang="en-US" smtClean="0"/>
-              <a:t>2020-09-21</a:t>
+              <a:t>2020-12-22</a:t>
             </a:fld>
             <a:endParaRPr lang="en-US"/>
           </a:p>
@@ -1764,7 +1764,7 @@
           <a:p>
             <a:fld id="{FC080E38-6FF2-48B3-BDAB-4FA23B840E92}" type="datetimeFigureOut">
               <a:rPr lang="en-US" smtClean="0"/>
-              <a:t>2020-09-21</a:t>
+              <a:t>2020-12-22</a:t>
             </a:fld>
             <a:endParaRPr lang="en-US"/>
           </a:p>
@@ -1882,7 +1882,7 @@
           <a:p>
             <a:fld id="{FC080E38-6FF2-48B3-BDAB-4FA23B840E92}" type="datetimeFigureOut">
               <a:rPr lang="en-US" smtClean="0"/>
-              <a:t>2020-09-21</a:t>
+              <a:t>2020-12-22</a:t>
             </a:fld>
             <a:endParaRPr lang="en-US"/>
           </a:p>
@@ -1977,7 +1977,7 @@
           <a:p>
             <a:fld id="{FC080E38-6FF2-48B3-BDAB-4FA23B840E92}" type="datetimeFigureOut">
               <a:rPr lang="en-US" smtClean="0"/>
-              <a:t>2020-09-21</a:t>
+              <a:t>2020-12-22</a:t>
             </a:fld>
             <a:endParaRPr lang="en-US"/>
           </a:p>
@@ -2254,7 +2254,7 @@
           <a:p>
             <a:fld id="{FC080E38-6FF2-48B3-BDAB-4FA23B840E92}" type="datetimeFigureOut">
               <a:rPr lang="en-US" smtClean="0"/>
-              <a:t>2020-09-21</a:t>
+              <a:t>2020-12-22</a:t>
             </a:fld>
             <a:endParaRPr lang="en-US"/>
           </a:p>
@@ -2507,7 +2507,7 @@
           <a:p>
             <a:fld id="{FC080E38-6FF2-48B3-BDAB-4FA23B840E92}" type="datetimeFigureOut">
               <a:rPr lang="en-US" smtClean="0"/>
-              <a:t>2020-09-21</a:t>
+              <a:t>2020-12-22</a:t>
             </a:fld>
             <a:endParaRPr lang="en-US"/>
           </a:p>
@@ -2720,7 +2720,7 @@
           <a:p>
             <a:fld id="{FC080E38-6FF2-48B3-BDAB-4FA23B840E92}" type="datetimeFigureOut">
               <a:rPr lang="en-US" smtClean="0"/>
-              <a:t>2020-09-21</a:t>
+              <a:t>2020-12-22</a:t>
             </a:fld>
             <a:endParaRPr lang="en-US"/>
           </a:p>
@@ -3355,7 +3355,7 @@
       </p:grpSp>
       <p:pic>
         <p:nvPicPr>
-          <p:cNvPr id="38" name="Picture 37"/>
+          <p:cNvPr id="3" name="Picture 2"/>
           <p:cNvPicPr>
             <a:picLocks noChangeAspect="1"/>
           </p:cNvPicPr>
@@ -3375,13 +3375,13 @@
         </p:blipFill>
         <p:spPr>
           <a:xfrm>
-            <a:off x="3965033" y="1844824"/>
+            <a:off x="3966216" y="1844824"/>
             <a:ext cx="2314375" cy="4114999"/>
           </a:xfrm>
           <a:prstGeom prst="rect">
             <a:avLst/>
           </a:prstGeom>
-          <a:ln>
+          <a:ln w="9525">
             <a:solidFill>
               <a:schemeClr val="bg1">
                 <a:lumMod val="50000"/>
@@ -4526,7 +4526,7 @@
         </p:nvCxnSpPr>
         <p:spPr>
           <a:xfrm flipH="1">
-            <a:off x="5778137" y="4207912"/>
+            <a:off x="5778137" y="4347724"/>
             <a:ext cx="720000" cy="0"/>
           </a:xfrm>
           <a:prstGeom prst="straightConnector1">
@@ -4564,7 +4564,7 @@
         </p:nvSpPr>
         <p:spPr>
           <a:xfrm>
-            <a:off x="6470593" y="3837837"/>
+            <a:off x="6470593" y="3977649"/>
             <a:ext cx="1588897" cy="1384995"/>
           </a:xfrm>
           <a:prstGeom prst="rect">
@@ -4669,10 +4669,10 @@
         </p:nvGrpSpPr>
         <p:grpSpPr>
           <a:xfrm>
-            <a:off x="3552429" y="5247086"/>
-            <a:ext cx="4130678" cy="1416182"/>
-            <a:chOff x="4257746" y="5387398"/>
-            <a:chExt cx="4130678" cy="1416182"/>
+            <a:off x="3552429" y="5013176"/>
+            <a:ext cx="4130678" cy="1650092"/>
+            <a:chOff x="4257746" y="5153488"/>
+            <a:chExt cx="4130678" cy="1650092"/>
           </a:xfrm>
         </p:grpSpPr>
         <p:sp>
@@ -4767,8 +4767,8 @@
           </p:nvSpPr>
           <p:spPr>
             <a:xfrm>
-              <a:off x="4257746" y="5387398"/>
-              <a:ext cx="588099" cy="1081570"/>
+              <a:off x="4257746" y="5153488"/>
+              <a:ext cx="588099" cy="1315480"/>
             </a:xfrm>
             <a:custGeom>
               <a:avLst/>

</xml_diff>